<commit_message>
pipeline docs images updated
</commit_message>
<xml_diff>
--- a/pipeline-docs/pipeline-overview.pptx
+++ b/pipeline-docs/pipeline-overview.pptx
@@ -104,6 +104,22 @@
       </a:defRPr>
     </a:lvl9pPr>
   </p:defaultTextStyle>
+  <p:extLst>
+    <p:ext uri="{EFAFB233-063F-42B5-8137-9DF3F51BA10A}">
+      <p15:sldGuideLst xmlns:p15="http://schemas.microsoft.com/office/powerpoint/2012/main">
+        <p15:guide id="1" orient="horz" pos="818">
+          <p15:clr>
+            <a:srgbClr val="A4A3A4"/>
+          </p15:clr>
+        </p15:guide>
+        <p15:guide id="2" pos="2880">
+          <p15:clr>
+            <a:srgbClr val="A4A3A4"/>
+          </p15:clr>
+        </p15:guide>
+      </p15:sldGuideLst>
+    </p:ext>
+  </p:extLst>
 </p:presentation>
 </file>
 
@@ -288,7 +304,7 @@
           <a:p>
             <a:fld id="{701281A9-B0B9-6544-B1C4-8F5A43E05F3C}" type="datetimeFigureOut">
               <a:rPr lang="en-US" smtClean="0"/>
-              <a:t>26/11/15</a:t>
+              <a:t>5/19/16</a:t>
             </a:fld>
             <a:endParaRPr lang="en-US"/>
           </a:p>
@@ -458,7 +474,7 @@
           <a:p>
             <a:fld id="{701281A9-B0B9-6544-B1C4-8F5A43E05F3C}" type="datetimeFigureOut">
               <a:rPr lang="en-US" smtClean="0"/>
-              <a:t>26/11/15</a:t>
+              <a:t>5/19/16</a:t>
             </a:fld>
             <a:endParaRPr lang="en-US"/>
           </a:p>
@@ -638,7 +654,7 @@
           <a:p>
             <a:fld id="{701281A9-B0B9-6544-B1C4-8F5A43E05F3C}" type="datetimeFigureOut">
               <a:rPr lang="en-US" smtClean="0"/>
-              <a:t>26/11/15</a:t>
+              <a:t>5/19/16</a:t>
             </a:fld>
             <a:endParaRPr lang="en-US"/>
           </a:p>
@@ -808,7 +824,7 @@
           <a:p>
             <a:fld id="{701281A9-B0B9-6544-B1C4-8F5A43E05F3C}" type="datetimeFigureOut">
               <a:rPr lang="en-US" smtClean="0"/>
-              <a:t>26/11/15</a:t>
+              <a:t>5/19/16</a:t>
             </a:fld>
             <a:endParaRPr lang="en-US"/>
           </a:p>
@@ -1054,7 +1070,7 @@
           <a:p>
             <a:fld id="{701281A9-B0B9-6544-B1C4-8F5A43E05F3C}" type="datetimeFigureOut">
               <a:rPr lang="en-US" smtClean="0"/>
-              <a:t>26/11/15</a:t>
+              <a:t>5/19/16</a:t>
             </a:fld>
             <a:endParaRPr lang="en-US"/>
           </a:p>
@@ -1342,7 +1358,7 @@
           <a:p>
             <a:fld id="{701281A9-B0B9-6544-B1C4-8F5A43E05F3C}" type="datetimeFigureOut">
               <a:rPr lang="en-US" smtClean="0"/>
-              <a:t>26/11/15</a:t>
+              <a:t>5/19/16</a:t>
             </a:fld>
             <a:endParaRPr lang="en-US"/>
           </a:p>
@@ -1764,7 +1780,7 @@
           <a:p>
             <a:fld id="{701281A9-B0B9-6544-B1C4-8F5A43E05F3C}" type="datetimeFigureOut">
               <a:rPr lang="en-US" smtClean="0"/>
-              <a:t>26/11/15</a:t>
+              <a:t>5/19/16</a:t>
             </a:fld>
             <a:endParaRPr lang="en-US"/>
           </a:p>
@@ -1882,7 +1898,7 @@
           <a:p>
             <a:fld id="{701281A9-B0B9-6544-B1C4-8F5A43E05F3C}" type="datetimeFigureOut">
               <a:rPr lang="en-US" smtClean="0"/>
-              <a:t>26/11/15</a:t>
+              <a:t>5/19/16</a:t>
             </a:fld>
             <a:endParaRPr lang="en-US"/>
           </a:p>
@@ -1977,7 +1993,7 @@
           <a:p>
             <a:fld id="{701281A9-B0B9-6544-B1C4-8F5A43E05F3C}" type="datetimeFigureOut">
               <a:rPr lang="en-US" smtClean="0"/>
-              <a:t>26/11/15</a:t>
+              <a:t>5/19/16</a:t>
             </a:fld>
             <a:endParaRPr lang="en-US"/>
           </a:p>
@@ -2254,7 +2270,7 @@
           <a:p>
             <a:fld id="{701281A9-B0B9-6544-B1C4-8F5A43E05F3C}" type="datetimeFigureOut">
               <a:rPr lang="en-US" smtClean="0"/>
-              <a:t>26/11/15</a:t>
+              <a:t>5/19/16</a:t>
             </a:fld>
             <a:endParaRPr lang="en-US"/>
           </a:p>
@@ -2507,7 +2523,7 @@
           <a:p>
             <a:fld id="{701281A9-B0B9-6544-B1C4-8F5A43E05F3C}" type="datetimeFigureOut">
               <a:rPr lang="en-US" smtClean="0"/>
-              <a:t>26/11/15</a:t>
+              <a:t>5/19/16</a:t>
             </a:fld>
             <a:endParaRPr lang="en-US"/>
           </a:p>
@@ -2720,7 +2736,7 @@
           <a:p>
             <a:fld id="{701281A9-B0B9-6544-B1C4-8F5A43E05F3C}" type="datetimeFigureOut">
               <a:rPr lang="en-US" smtClean="0"/>
-              <a:t>26/11/15</a:t>
+              <a:t>5/19/16</a:t>
             </a:fld>
             <a:endParaRPr lang="en-US"/>
           </a:p>
@@ -4305,7 +4321,23 @@
                   <a:schemeClr val="bg1"/>
                 </a:solidFill>
               </a:rPr>
-              <a:t>Travis CI</a:t>
+              <a:t>Travis </a:t>
+            </a:r>
+            <a:r>
+              <a:rPr lang="en-US" sz="1000" b="1" dirty="0" smtClean="0">
+                <a:solidFill>
+                  <a:schemeClr val="bg1"/>
+                </a:solidFill>
+              </a:rPr>
+              <a:t>CI  /  Snap CI  /  </a:t>
+            </a:r>
+            <a:r>
+              <a:rPr lang="is-IS" sz="1000" b="1" smtClean="0">
+                <a:solidFill>
+                  <a:schemeClr val="bg1"/>
+                </a:solidFill>
+              </a:rPr>
+              <a:t>…</a:t>
             </a:r>
             <a:endParaRPr lang="en-US" sz="1000" b="1" dirty="0">
               <a:solidFill>
@@ -4397,28 +4429,20 @@
           <a:prstGeom prst="cloud">
             <a:avLst/>
           </a:prstGeom>
-          <a:solidFill>
-            <a:schemeClr val="bg1">
-              <a:lumMod val="85000"/>
-            </a:schemeClr>
-          </a:solidFill>
-          <a:ln>
-            <a:noFill/>
-          </a:ln>
-          <a:effectLst/>
+          <a:ln w="6350"/>
         </p:spPr>
         <p:style>
-          <a:lnRef idx="1">
-            <a:schemeClr val="accent1"/>
+          <a:lnRef idx="2">
+            <a:schemeClr val="dk1"/>
           </a:lnRef>
-          <a:fillRef idx="3">
-            <a:schemeClr val="accent1"/>
+          <a:fillRef idx="1">
+            <a:schemeClr val="lt1"/>
           </a:fillRef>
-          <a:effectRef idx="2">
-            <a:schemeClr val="accent1"/>
+          <a:effectRef idx="0">
+            <a:schemeClr val="dk1"/>
           </a:effectRef>
           <a:fontRef idx="minor">
-            <a:schemeClr val="lt1"/>
+            <a:schemeClr val="dk1"/>
           </a:fontRef>
         </p:style>
         <p:txBody>
@@ -4432,26 +4456,79 @@
                   <a:schemeClr val="tx1"/>
                 </a:solidFill>
               </a:rPr>
-              <a:t>Ongoing work:</a:t>
-            </a:r>
-          </a:p>
-          <a:p>
-            <a:pPr algn="ctr"/>
+              <a:t>Staging</a:t>
+            </a:r>
             <a:r>
               <a:rPr lang="en-US" sz="1000" i="1" dirty="0" smtClean="0">
                 <a:solidFill>
                   <a:schemeClr val="tx1"/>
                 </a:solidFill>
               </a:rPr>
-              <a:t>Staging, Production, e.g. using </a:t>
-            </a:r>
-            <a:r>
-              <a:rPr lang="en-US" sz="1000" i="1" dirty="0" err="1" smtClean="0">
+              <a:t>, Production</a:t>
+            </a:r>
+            <a:r>
+              <a:rPr lang="en-US" sz="1000" i="1" dirty="0" smtClean="0">
                 <a:solidFill>
                   <a:schemeClr val="tx1"/>
                 </a:solidFill>
               </a:rPr>
-              <a:t>Kubernetes</a:t>
+              <a:t>, </a:t>
+            </a:r>
+            <a:r>
+              <a:rPr lang="is-IS" sz="1000" i="1" dirty="0" smtClean="0">
+                <a:solidFill>
+                  <a:schemeClr val="tx1"/>
+                </a:solidFill>
+              </a:rPr>
+              <a:t>…</a:t>
+            </a:r>
+            <a:r>
+              <a:rPr lang="en-US" sz="1000" i="1" dirty="0" smtClean="0">
+                <a:solidFill>
+                  <a:schemeClr val="tx1"/>
+                </a:solidFill>
+              </a:rPr>
+              <a:t> </a:t>
+            </a:r>
+            <a:r>
+              <a:rPr lang="en-US" sz="1000" i="1" dirty="0" smtClean="0">
+                <a:solidFill>
+                  <a:schemeClr val="tx1"/>
+                </a:solidFill>
+              </a:rPr>
+              <a:t>e.g</a:t>
+            </a:r>
+            <a:r>
+              <a:rPr lang="en-US" sz="1000" i="1" dirty="0" smtClean="0">
+                <a:solidFill>
+                  <a:schemeClr val="tx1"/>
+                </a:solidFill>
+              </a:rPr>
+              <a:t>. </a:t>
+            </a:r>
+            <a:r>
+              <a:rPr lang="en-US" sz="1000" i="1" dirty="0" smtClean="0">
+                <a:solidFill>
+                  <a:schemeClr val="tx1"/>
+                </a:solidFill>
+              </a:rPr>
+              <a:t>using </a:t>
+            </a:r>
+            <a:r>
+              <a:rPr lang="en-US" sz="1000" i="1" dirty="0" smtClean="0">
+                <a:solidFill>
+                  <a:schemeClr val="tx1"/>
+                </a:solidFill>
+              </a:rPr>
+              <a:t>Kubernetes, </a:t>
+            </a:r>
+            <a:r>
+              <a:rPr lang="is-IS" sz="1000" i="1" dirty="0" smtClean="0">
+                <a:solidFill>
+                  <a:schemeClr val="tx1"/>
+                </a:solidFill>
+              </a:rPr>
+              <a:t>…</a:t>
             </a:r>
             <a:endParaRPr lang="en-US" sz="1000" i="1" dirty="0">
               <a:solidFill>
@@ -4472,8 +4549,8 @@
         </p:nvCxnSpPr>
         <p:spPr>
           <a:xfrm flipV="1">
-            <a:off x="7924911" y="1326478"/>
-            <a:ext cx="459305" cy="1035363"/>
+            <a:off x="7819697" y="1326478"/>
+            <a:ext cx="564519" cy="1016562"/>
           </a:xfrm>
           <a:prstGeom prst="bentConnector2">
             <a:avLst/>
@@ -4510,8 +4587,8 @@
         </p:nvSpPr>
         <p:spPr>
           <a:xfrm>
-            <a:off x="7599368" y="2197731"/>
-            <a:ext cx="325543" cy="328219"/>
+            <a:off x="7458470" y="2136228"/>
+            <a:ext cx="361227" cy="413624"/>
           </a:xfrm>
           <a:prstGeom prst="can">
             <a:avLst/>
@@ -4519,15 +4596,13 @@
           <a:ln/>
         </p:spPr>
         <p:style>
-          <a:lnRef idx="2">
-            <a:schemeClr val="accent4">
-              <a:shade val="50000"/>
-            </a:schemeClr>
+          <a:lnRef idx="0">
+            <a:schemeClr val="accent4"/>
           </a:lnRef>
-          <a:fillRef idx="1">
+          <a:fillRef idx="3">
             <a:schemeClr val="accent4"/>
           </a:fillRef>
-          <a:effectRef idx="0">
+          <a:effectRef idx="3">
             <a:schemeClr val="accent4"/>
           </a:effectRef>
           <a:fontRef idx="minor">

</xml_diff>